<commit_message>
Updated friction co-efficient in presentation
</commit_message>
<xml_diff>
--- a/GP/Group5_GP/Group Presentation.pptx
+++ b/GP/Group5_GP/Group Presentation.pptx
@@ -8146,7 +8146,7 @@
         <p:fade/>
       </p:transition>
     </mc:Choice>
-    <mc:Fallback xmlns="" xmlns:mv="urn:schemas-microsoft-com:mac:vml" xmlns:c="http://schemas.openxmlformats.org/drawingml/2006/chart" xmlns:dgm="http://schemas.openxmlformats.org/drawingml/2006/diagram" xmlns:o="urn:schemas-microsoft-com:office:office" xmlns:v="urn:schemas-microsoft-com:vml" xmlns:pvml="urn:schemas-microsoft-com:office:powerpoint" xmlns:com="http://schemas.openxmlformats.org/drawingml/2006/compatibility" xmlns:p15="http://schemas.microsoft.com/office/powerpoint/2012/main" xmlns:ahyp="http://schemas.microsoft.com/office/drawing/2018/hyperlinkcolor">
+    <mc:Fallback xmlns:ahyp="http://schemas.microsoft.com/office/drawing/2018/hyperlinkcolor" xmlns:p15="http://schemas.microsoft.com/office/powerpoint/2012/main" xmlns:com="http://schemas.openxmlformats.org/drawingml/2006/compatibility" xmlns:pvml="urn:schemas-microsoft-com:office:powerpoint" xmlns:v="urn:schemas-microsoft-com:vml" xmlns:o="urn:schemas-microsoft-com:office:office" xmlns:dgm="http://schemas.openxmlformats.org/drawingml/2006/diagram" xmlns:c="http://schemas.openxmlformats.org/drawingml/2006/chart" xmlns:mv="urn:schemas-microsoft-com:mac:vml" xmlns="">
       <p:transition spd="slow">
         <p:fade/>
       </p:transition>
@@ -24918,7 +24918,7 @@
         <p:fade/>
       </p:transition>
     </mc:Choice>
-    <mc:Fallback xmlns="" xmlns:mv="urn:schemas-microsoft-com:mac:vml" xmlns:c="http://schemas.openxmlformats.org/drawingml/2006/chart" xmlns:dgm="http://schemas.openxmlformats.org/drawingml/2006/diagram" xmlns:o="urn:schemas-microsoft-com:office:office" xmlns:v="urn:schemas-microsoft-com:vml" xmlns:pvml="urn:schemas-microsoft-com:office:powerpoint" xmlns:com="http://schemas.openxmlformats.org/drawingml/2006/compatibility" xmlns:p15="http://schemas.microsoft.com/office/powerpoint/2012/main" xmlns:ahyp="http://schemas.microsoft.com/office/drawing/2018/hyperlinkcolor">
+    <mc:Fallback xmlns:ahyp="http://schemas.microsoft.com/office/drawing/2018/hyperlinkcolor" xmlns:p15="http://schemas.microsoft.com/office/powerpoint/2012/main" xmlns:com="http://schemas.openxmlformats.org/drawingml/2006/compatibility" xmlns:pvml="urn:schemas-microsoft-com:office:powerpoint" xmlns:v="urn:schemas-microsoft-com:vml" xmlns:o="urn:schemas-microsoft-com:office:office" xmlns:dgm="http://schemas.openxmlformats.org/drawingml/2006/diagram" xmlns:c="http://schemas.openxmlformats.org/drawingml/2006/chart" xmlns:mv="urn:schemas-microsoft-com:mac:vml" xmlns="">
       <p:transition spd="slow">
         <p:fade/>
       </p:transition>
@@ -45575,8 +45575,8 @@
           </a:p>
         </p:txBody>
       </p:sp>
-      <mc:AlternateContent xmlns:mc="http://schemas.openxmlformats.org/markup-compatibility/2006">
-        <mc:Choice xmlns:a14="http://schemas.microsoft.com/office/drawing/2010/main" Requires="a14">
+      <mc:AlternateContent xmlns:mc="http://schemas.openxmlformats.org/markup-compatibility/2006" xmlns:a14="http://schemas.microsoft.com/office/drawing/2010/main">
+        <mc:Choice Requires="a14">
           <p:sp>
             <p:nvSpPr>
               <p:cNvPr id="5" name="Text Placeholder 4">
@@ -45834,7 +45834,7 @@
             </p:txBody>
           </p:sp>
         </mc:Choice>
-        <mc:Fallback>
+        <mc:Fallback xmlns="">
           <p:sp>
             <p:nvSpPr>
               <p:cNvPr id="5" name="Text Placeholder 4">
@@ -47542,35 +47542,6 @@
       </p:sp>
       <p:pic>
         <p:nvPicPr>
-          <p:cNvPr id="3" name="Picture 2">
-            <a:extLst>
-              <a:ext uri="{FF2B5EF4-FFF2-40B4-BE49-F238E27FC236}">
-                <a16:creationId xmlns:a16="http://schemas.microsoft.com/office/drawing/2014/main" id="{64F96293-916E-1145-298B-FEF5D0C70503}"/>
-              </a:ext>
-            </a:extLst>
-          </p:cNvPr>
-          <p:cNvPicPr>
-            <a:picLocks noChangeAspect="1"/>
-          </p:cNvPicPr>
-          <p:nvPr/>
-        </p:nvPicPr>
-        <p:blipFill rotWithShape="1">
-          <a:blip r:embed="rId4"/>
-          <a:srcRect l="290" t="2131" r="1"/>
-          <a:stretch/>
-        </p:blipFill>
-        <p:spPr>
-          <a:xfrm>
-            <a:off x="34978" y="3554729"/>
-            <a:ext cx="4422373" cy="2215103"/>
-          </a:xfrm>
-          <a:prstGeom prst="rect">
-            <a:avLst/>
-          </a:prstGeom>
-        </p:spPr>
-      </p:pic>
-      <p:pic>
-        <p:nvPicPr>
           <p:cNvPr id="6" name="Picture 5">
             <a:extLst>
               <a:ext uri="{FF2B5EF4-FFF2-40B4-BE49-F238E27FC236}">
@@ -47584,7 +47555,7 @@
           <p:nvPr/>
         </p:nvPicPr>
         <p:blipFill rotWithShape="1">
-          <a:blip r:embed="rId5"/>
+          <a:blip r:embed="rId4"/>
           <a:srcRect l="469" t="2427" r="846" b="2026"/>
           <a:stretch/>
         </p:blipFill>
@@ -47613,7 +47584,7 @@
           <p:nvPr/>
         </p:nvPicPr>
         <p:blipFill>
-          <a:blip r:embed="rId6"/>
+          <a:blip r:embed="rId5"/>
           <a:stretch>
             <a:fillRect/>
           </a:stretch>
@@ -47663,7 +47634,7 @@
             <p:nvPr/>
           </p:nvPicPr>
           <p:blipFill>
-            <a:blip r:embed="rId7"/>
+            <a:blip r:embed="rId6"/>
             <a:stretch>
               <a:fillRect/>
             </a:stretch>
@@ -47693,7 +47664,7 @@
             <p:nvPr/>
           </p:nvPicPr>
           <p:blipFill>
-            <a:blip r:embed="rId8"/>
+            <a:blip r:embed="rId7"/>
             <a:stretch>
               <a:fillRect/>
             </a:stretch>
@@ -47709,6 +47680,35 @@
           </p:spPr>
         </p:pic>
       </p:grpSp>
+      <p:pic>
+        <p:nvPicPr>
+          <p:cNvPr id="4" name="Picture 3">
+            <a:extLst>
+              <a:ext uri="{FF2B5EF4-FFF2-40B4-BE49-F238E27FC236}">
+                <a16:creationId xmlns:a16="http://schemas.microsoft.com/office/drawing/2014/main" id="{60ADA27B-BACC-3FDF-35EA-2E7BE6A43CCC}"/>
+              </a:ext>
+            </a:extLst>
+          </p:cNvPr>
+          <p:cNvPicPr>
+            <a:picLocks noChangeAspect="1"/>
+          </p:cNvPicPr>
+          <p:nvPr/>
+        </p:nvPicPr>
+        <p:blipFill rotWithShape="1">
+          <a:blip r:embed="rId8"/>
+          <a:srcRect l="1049" t="3957" r="1870" b="2359"/>
+          <a:stretch/>
+        </p:blipFill>
+        <p:spPr>
+          <a:xfrm>
+            <a:off x="-8155" y="3519406"/>
+            <a:ext cx="4416727" cy="2227484"/>
+          </a:xfrm>
+          <a:prstGeom prst="rect">
+            <a:avLst/>
+          </a:prstGeom>
+        </p:spPr>
+      </p:pic>
     </p:spTree>
   </p:cSld>
   <p:clrMapOvr>
@@ -47964,7 +47964,20 @@
                 <a:effectLst/>
                 <a:latin typeface="Arial" panose="020B0604020202020204" pitchFamily="34" charset="0"/>
               </a:rPr>
-              <a:t>Reference longitudinal velocity is 100 kmph and friction coefficient is 1</a:t>
+              <a:t>Reference longitudinal velocity is 100 kmph and friction coefficient is 0.3.</a:t>
+            </a:r>
+          </a:p>
+          <a:p>
+            <a:pPr marL="285750" indent="-285750">
+              <a:lnSpc>
+                <a:spcPct val="150000"/>
+              </a:lnSpc>
+            </a:pPr>
+            <a:r>
+              <a:rPr lang="en-US" sz="1800" dirty="0">
+                <a:latin typeface="Arial" panose="020B0604020202020204" pitchFamily="34" charset="0"/>
+              </a:rPr>
+              <a:t>Low friction coefficient is considered to simulate higher sideslip angle evolution.</a:t>
             </a:r>
             <a:endParaRPr sz="1800" dirty="0"/>
           </a:p>
@@ -49494,7 +49507,7 @@
         <p:fade/>
       </p:transition>
     </mc:Choice>
-    <mc:Fallback xmlns="" xmlns:mv="urn:schemas-microsoft-com:mac:vml" xmlns:c="http://schemas.openxmlformats.org/drawingml/2006/chart" xmlns:dgm="http://schemas.openxmlformats.org/drawingml/2006/diagram" xmlns:o="urn:schemas-microsoft-com:office:office" xmlns:v="urn:schemas-microsoft-com:vml" xmlns:pvml="urn:schemas-microsoft-com:office:powerpoint" xmlns:com="http://schemas.openxmlformats.org/drawingml/2006/compatibility" xmlns:p15="http://schemas.microsoft.com/office/powerpoint/2012/main" xmlns:ahyp="http://schemas.microsoft.com/office/drawing/2018/hyperlinkcolor">
+    <mc:Fallback xmlns:ahyp="http://schemas.microsoft.com/office/drawing/2018/hyperlinkcolor" xmlns:p15="http://schemas.microsoft.com/office/powerpoint/2012/main" xmlns:com="http://schemas.openxmlformats.org/drawingml/2006/compatibility" xmlns:pvml="urn:schemas-microsoft-com:office:powerpoint" xmlns:v="urn:schemas-microsoft-com:vml" xmlns:o="urn:schemas-microsoft-com:office:office" xmlns:dgm="http://schemas.openxmlformats.org/drawingml/2006/diagram" xmlns:c="http://schemas.openxmlformats.org/drawingml/2006/chart" xmlns:mv="urn:schemas-microsoft-com:mac:vml" xmlns="">
       <p:transition spd="slow">
         <p:fade/>
       </p:transition>
@@ -49710,7 +49723,7 @@
         <p:fade/>
       </p:transition>
     </mc:Choice>
-    <mc:Fallback xmlns="" xmlns:mv="urn:schemas-microsoft-com:mac:vml" xmlns:c="http://schemas.openxmlformats.org/drawingml/2006/chart" xmlns:dgm="http://schemas.openxmlformats.org/drawingml/2006/diagram" xmlns:o="urn:schemas-microsoft-com:office:office" xmlns:v="urn:schemas-microsoft-com:vml" xmlns:pvml="urn:schemas-microsoft-com:office:powerpoint" xmlns:com="http://schemas.openxmlformats.org/drawingml/2006/compatibility" xmlns:p15="http://schemas.microsoft.com/office/powerpoint/2012/main" xmlns:ahyp="http://schemas.microsoft.com/office/drawing/2018/hyperlinkcolor">
+    <mc:Fallback xmlns:ahyp="http://schemas.microsoft.com/office/drawing/2018/hyperlinkcolor" xmlns:p15="http://schemas.microsoft.com/office/powerpoint/2012/main" xmlns:com="http://schemas.openxmlformats.org/drawingml/2006/compatibility" xmlns:pvml="urn:schemas-microsoft-com:office:powerpoint" xmlns:v="urn:schemas-microsoft-com:vml" xmlns:o="urn:schemas-microsoft-com:office:office" xmlns:dgm="http://schemas.openxmlformats.org/drawingml/2006/diagram" xmlns:c="http://schemas.openxmlformats.org/drawingml/2006/chart" xmlns:mv="urn:schemas-microsoft-com:mac:vml" xmlns="">
       <p:transition spd="slow">
         <p:fade/>
       </p:transition>

</xml_diff>